<commit_message>
Splatting code, finished demos
</commit_message>
<xml_diff>
--- a/Summit_2021_Template.pptx
+++ b/Summit_2021_Template.pptx
@@ -16,9 +16,9 @@
     <p:sldId id="265" r:id="rId10"/>
     <p:sldId id="266" r:id="rId11"/>
     <p:sldId id="267" r:id="rId12"/>
-    <p:sldId id="261" r:id="rId13"/>
-    <p:sldId id="258" r:id="rId14"/>
-    <p:sldId id="259" r:id="rId15"/>
+    <p:sldId id="268" r:id="rId13"/>
+    <p:sldId id="269" r:id="rId14"/>
+    <p:sldId id="261" r:id="rId15"/>
   </p:sldIdLst>
   <p:sldSz cx="12192000" cy="6858000"/>
   <p:notesSz cx="6858000" cy="9144000"/>
@@ -130,14 +130,13 @@
             <p14:sldId id="265"/>
             <p14:sldId id="266"/>
             <p14:sldId id="267"/>
+            <p14:sldId id="268"/>
+            <p14:sldId id="269"/>
             <p14:sldId id="261"/>
-            <p14:sldId id="258"/>
           </p14:sldIdLst>
         </p14:section>
         <p14:section name="Test" id="{65E23ACA-B548-CA4E-BFBB-4D12180E2104}">
-          <p14:sldIdLst>
-            <p14:sldId id="259"/>
-          </p14:sldIdLst>
+          <p14:sldIdLst/>
         </p14:section>
       </p14:sectionLst>
     </p:ext>
@@ -685,7 +684,7 @@
           <a:p>
             <a:fld id="{77BE42BC-516C-7642-9C66-7F3879A4895A}" type="datetimeFigureOut">
               <a:rPr lang="en-US" smtClean="0"/>
-              <a:t>4/8/21</a:t>
+              <a:t>4/12/21</a:t>
             </a:fld>
             <a:endParaRPr lang="en-US"/>
           </a:p>
@@ -1025,7 +1024,7 @@
           <a:p>
             <a:r>
               <a:rPr lang="en-US" dirty="0"/>
-              <a:t>So with that, lets get started</a:t>
+              <a:t>We have a lot of content to cover today, So with that, lets get started</a:t>
             </a:r>
           </a:p>
           <a:p>
@@ -1060,6 +1059,90 @@
     <p:extLst>
       <p:ext uri="{BB962C8B-B14F-4D97-AF65-F5344CB8AC3E}">
         <p14:creationId xmlns:p14="http://schemas.microsoft.com/office/powerpoint/2010/main" val="458956709"/>
+      </p:ext>
+    </p:extLst>
+  </p:cSld>
+  <p:clrMapOvr>
+    <a:masterClrMapping/>
+  </p:clrMapOvr>
+</p:notes>
+</file>
+
+<file path=ppt/notesSlides/notesSlide10.xml><?xml version="1.0" encoding="utf-8"?>
+<p:notes xmlns:a="http://schemas.openxmlformats.org/drawingml/2006/main" xmlns:r="http://schemas.openxmlformats.org/officeDocument/2006/relationships" xmlns:p="http://schemas.openxmlformats.org/presentationml/2006/main">
+  <p:cSld>
+    <p:spTree>
+      <p:nvGrpSpPr>
+        <p:cNvPr id="1" name=""/>
+        <p:cNvGrpSpPr/>
+        <p:nvPr/>
+      </p:nvGrpSpPr>
+      <p:grpSpPr>
+        <a:xfrm>
+          <a:off x="0" y="0"/>
+          <a:ext cx="0" cy="0"/>
+          <a:chOff x="0" y="0"/>
+          <a:chExt cx="0" cy="0"/>
+        </a:xfrm>
+      </p:grpSpPr>
+      <p:sp>
+        <p:nvSpPr>
+          <p:cNvPr id="2" name="Slide Image Placeholder 1"/>
+          <p:cNvSpPr>
+            <a:spLocks noGrp="1" noRot="1" noChangeAspect="1"/>
+          </p:cNvSpPr>
+          <p:nvPr>
+            <p:ph type="sldImg"/>
+          </p:nvPr>
+        </p:nvSpPr>
+        <p:spPr/>
+      </p:sp>
+      <p:sp>
+        <p:nvSpPr>
+          <p:cNvPr id="3" name="Notes Placeholder 2"/>
+          <p:cNvSpPr>
+            <a:spLocks noGrp="1"/>
+          </p:cNvSpPr>
+          <p:nvPr>
+            <p:ph type="body" idx="1"/>
+          </p:nvPr>
+        </p:nvSpPr>
+        <p:spPr/>
+        <p:txBody>
+          <a:bodyPr/>
+          <a:lstStyle/>
+          <a:p>
+            <a:endParaRPr lang="en-US" dirty="0"/>
+          </a:p>
+        </p:txBody>
+      </p:sp>
+      <p:sp>
+        <p:nvSpPr>
+          <p:cNvPr id="4" name="Slide Number Placeholder 3"/>
+          <p:cNvSpPr>
+            <a:spLocks noGrp="1"/>
+          </p:cNvSpPr>
+          <p:nvPr>
+            <p:ph type="sldNum" sz="quarter" idx="5"/>
+          </p:nvPr>
+        </p:nvSpPr>
+        <p:spPr/>
+        <p:txBody>
+          <a:bodyPr/>
+          <a:lstStyle/>
+          <a:p>
+            <a:fld id="{CE90C867-5C94-4B47-880B-A8B69EB830B0}" type="slidenum">
+              <a:rPr lang="en-US" smtClean="0"/>
+              <a:t>10</a:t>
+            </a:fld>
+            <a:endParaRPr lang="en-US"/>
+          </a:p>
+        </p:txBody>
+      </p:sp>
+    </p:spTree>
+    <p:extLst>
+      <p:ext uri="{BB962C8B-B14F-4D97-AF65-F5344CB8AC3E}">
+        <p14:creationId xmlns:p14="http://schemas.microsoft.com/office/powerpoint/2010/main" val="2326302587"/>
       </p:ext>
     </p:extLst>
   </p:cSld>
@@ -1115,7 +1198,7 @@
           <a:p>
             <a:r>
               <a:rPr lang="en-US" dirty="0"/>
-              <a:t>Todays agenda, first we will go over What is the Microsoft Graph. Why should we use it and how is it valuable to me and my company. </a:t>
+              <a:t>For Todays agenda, we will be going over What is the Microsoft Graph. Why should we use it and how is it valuable to you and your company.</a:t>
             </a:r>
           </a:p>
           <a:p>
@@ -1124,7 +1207,59 @@
           <a:p>
             <a:r>
               <a:rPr lang="en-US" dirty="0"/>
-              <a:t>Next, we will then discover what kinds of data can be found in Microsoft Graph. </a:t>
+              <a:t>Next, we will then discover what kinds of data can be found within the Microsoft Graph. </a:t>
+            </a:r>
+          </a:p>
+          <a:p>
+            <a:endParaRPr lang="en-US" dirty="0"/>
+          </a:p>
+          <a:p>
+            <a:r>
+              <a:rPr lang="en-US" dirty="0"/>
+              <a:t>After that we will look at the API reference docs, where we'll learn how to find the endpoints for our API calls and what permissions are needed for each one.</a:t>
+            </a:r>
+          </a:p>
+          <a:p>
+            <a:endParaRPr lang="en-US" dirty="0"/>
+          </a:p>
+          <a:p>
+            <a:r>
+              <a:rPr lang="en-US" dirty="0"/>
+              <a:t>Then I will show you a quick glance at the Graph Explorer, a helpful tool from Microsoft that allows us to learn by doing within the Microsoft Graph, but also allows us to work with sample data.</a:t>
+            </a:r>
+          </a:p>
+          <a:p>
+            <a:endParaRPr lang="en-US" dirty="0"/>
+          </a:p>
+          <a:p>
+            <a:r>
+              <a:rPr lang="en-US" dirty="0"/>
+              <a:t>Following that is the PowerShell Graph SDK. A more </a:t>
+            </a:r>
+            <a:r>
+              <a:rPr lang="en-US" dirty="0" err="1"/>
+              <a:t>powershell</a:t>
+            </a:r>
+            <a:r>
+              <a:rPr lang="en-US" dirty="0"/>
+              <a:t>-friendly way to work within the API</a:t>
+            </a:r>
+          </a:p>
+          <a:p>
+            <a:endParaRPr lang="en-US" dirty="0"/>
+          </a:p>
+          <a:p>
+            <a:r>
+              <a:rPr lang="en-US" dirty="0"/>
+              <a:t>and finally, we will use the Invoke-</a:t>
+            </a:r>
+            <a:r>
+              <a:rPr lang="en-US" dirty="0" err="1"/>
+              <a:t>RestMethod</a:t>
+            </a:r>
+            <a:r>
+              <a:rPr lang="en-US" dirty="0"/>
+              <a:t> cmdlet to make API calls and view the responses</a:t>
             </a:r>
           </a:p>
         </p:txBody>
@@ -1211,6 +1346,15 @@
           <a:p>
             <a:r>
               <a:rPr lang="en-US" dirty="0"/>
+              <a:t>So first, What is the Microsoft Graph?</a:t>
+            </a:r>
+          </a:p>
+          <a:p>
+            <a:endParaRPr lang="en-US" dirty="0"/>
+          </a:p>
+          <a:p>
+            <a:r>
+              <a:rPr lang="en-US" dirty="0"/>
               <a:t>Microsoft Graph is a REST API that we can use to interact with our data that’s in Microsoft 365</a:t>
             </a:r>
           </a:p>
@@ -1226,7 +1370,16 @@
           <a:p>
             <a:r>
               <a:rPr lang="en-US" dirty="0"/>
-              <a:t>Microsoft 365 is a suite of services that goes from Office 365, so Exchange Online with email, contacts and calendar. Teams, SharePoint, Azure Active Directory, OneDrive, OneNote, Yammer, and so on. As well as Enterprise Mobility and Security and even the Windows 10 family of services. All the data that is exposed in those different services, are also exposed within the API.</a:t>
+              <a:t>We will be learning more those API methods in our upcoming demo</a:t>
+            </a:r>
+          </a:p>
+          <a:p>
+            <a:endParaRPr lang="en-US" dirty="0"/>
+          </a:p>
+          <a:p>
+            <a:r>
+              <a:rPr lang="en-US" dirty="0"/>
+              <a:t>Microsoft 365 is a suite of services that goes from Office 365, so think Exchange Online with email, contacts and calendar. to even Teams, SharePoint, Azure Active Directory, OneDrive, OneNote, Yammer, etc. As well as Enterprise Mobility and Security and even the Windows 10 family of services. All the data that is exposed in those different services, are also exposed within the API.</a:t>
             </a:r>
           </a:p>
           <a:p>
@@ -1243,7 +1396,7 @@
             </a:r>
             <a:r>
               <a:rPr lang="en-US" dirty="0"/>
-              <a:t> party data with Microsoft Graph Connectors.  864553 5390</a:t>
+              <a:t> party data with Microsoft Graph Connectors.  So we can bring in data from outside vendors like Box, Google Drive, Jira and Salesforce.</a:t>
             </a:r>
           </a:p>
         </p:txBody>
@@ -1328,7 +1481,72 @@
           <a:bodyPr/>
           <a:lstStyle/>
           <a:p>
+            <a:r>
+              <a:rPr lang="en-US" dirty="0"/>
+              <a:t>Next, what exactly is in Microsoft Graph?</a:t>
+            </a:r>
+          </a:p>
+          <a:p>
             <a:endParaRPr lang="en-US" dirty="0"/>
+          </a:p>
+          <a:p>
+            <a:r>
+              <a:rPr lang="en-US" dirty="0"/>
+              <a:t>So like I said, anything within the Microsoft 365 suite of products can be found in the Graph API. </a:t>
+            </a:r>
+          </a:p>
+          <a:p>
+            <a:endParaRPr lang="en-US" dirty="0"/>
+          </a:p>
+          <a:p>
+            <a:r>
+              <a:rPr lang="en-US" dirty="0"/>
+              <a:t>We can get events from our users calendars, make changes to those events, and even create new events.</a:t>
+            </a:r>
+          </a:p>
+          <a:p>
+            <a:endParaRPr lang="en-US" dirty="0"/>
+          </a:p>
+          <a:p>
+            <a:r>
+              <a:rPr lang="en-US" dirty="0"/>
+              <a:t>We can view </a:t>
+            </a:r>
+            <a:r>
+              <a:rPr lang="en-US" dirty="0" err="1"/>
+              <a:t>someones</a:t>
+            </a:r>
+            <a:r>
+              <a:rPr lang="en-US" dirty="0"/>
+              <a:t> organization hierarchy, who their manager is and who reports to them, get their presence information, and even download files from their OneDrive.</a:t>
+            </a:r>
+          </a:p>
+          <a:p>
+            <a:endParaRPr lang="en-US" dirty="0"/>
+          </a:p>
+          <a:p>
+            <a:r>
+              <a:rPr lang="en-US" dirty="0"/>
+              <a:t>We can send also send emails, Teams messages, and view organization security alerts.</a:t>
+            </a:r>
+          </a:p>
+          <a:p>
+            <a:endParaRPr lang="en-US" dirty="0"/>
+          </a:p>
+          <a:p>
+            <a:r>
+              <a:rPr lang="en-US" dirty="0"/>
+              <a:t>Microsoft Graph also includes built in reports out of the box like Azure AD Activity Reports, Microsoft 365 Usage Reports, and  Identity and Access Reports. </a:t>
+            </a:r>
+          </a:p>
+          <a:p>
+            <a:endParaRPr lang="en-US" dirty="0"/>
+          </a:p>
+          <a:p>
+            <a:r>
+              <a:rPr lang="en-US" dirty="0"/>
+              <a:t>This list you see here is just a small subset of items that are exposed within the Graph API.</a:t>
+            </a:r>
           </a:p>
         </p:txBody>
       </p:sp>
@@ -1416,11 +1634,54 @@
               <a:rPr lang="en-US" dirty="0">
                 <a:hlinkClick r:id="rId3"/>
               </a:rPr>
-              <a:t>List users - Microsoft Graph v1.0 | Microsoft Docs</a:t>
-            </a:r>
-            <a:r>
-              <a:rPr lang="en-US" dirty="0"/>
-              <a:t> </a:t>
+              <a:t>Microsoft provides rich detailed API documentation that lets us see what endpoints we need to send requests to, and also what permissions are needed to make the call. Permissions are always ordered from least privlidged to most privlidged. </a:t>
+            </a:r>
+          </a:p>
+          <a:p>
+            <a:endParaRPr lang="en-US" dirty="0">
+              <a:hlinkClick r:id="rId3"/>
+            </a:endParaRPr>
+          </a:p>
+          <a:p>
+            <a:r>
+              <a:rPr lang="en-US" dirty="0">
+                <a:hlinkClick r:id="rId3"/>
+              </a:rPr>
+              <a:t>We can access the API docs by going to aka.ms/GRAPHapiREF</a:t>
+            </a:r>
+          </a:p>
+          <a:p>
+            <a:endParaRPr lang="en-US" dirty="0">
+              <a:hlinkClick r:id="rId3"/>
+            </a:endParaRPr>
+          </a:p>
+          <a:p>
+            <a:r>
+              <a:rPr lang="en-US" dirty="0">
+                <a:hlinkClick r:id="rId3"/>
+              </a:rPr>
+              <a:t>The documentation also allows us to run sample queries using the Graph explorer that by default uses a sample tenant with test data.</a:t>
+            </a:r>
+          </a:p>
+          <a:p>
+            <a:endParaRPr lang="en-US" dirty="0">
+              <a:hlinkClick r:id="rId3"/>
+            </a:endParaRPr>
+          </a:p>
+          <a:p>
+            <a:r>
+              <a:rPr lang="en-US" dirty="0">
+                <a:hlinkClick r:id="rId3"/>
+              </a:rPr>
+              <a:t>So with talking about the Graph Explorer...lets see what makes it so valuable when working within this API</a:t>
+            </a:r>
+          </a:p>
+          <a:p>
+            <a:r>
+              <a:rPr lang="en-US" dirty="0">
+                <a:hlinkClick r:id="rId3"/>
+              </a:rPr>
+              <a:t>[NEXT SLIDE]</a:t>
             </a:r>
           </a:p>
         </p:txBody>
@@ -1505,6 +1766,20 @@
           <a:bodyPr/>
           <a:lstStyle/>
           <a:p>
+            <a:endParaRPr lang="en-US" u="none" dirty="0">
+              <a:solidFill>
+                <a:srgbClr val="0563C1"/>
+              </a:solidFill>
+              <a:hlinkClick r:id="rId3">
+                <a:extLst>
+                  <a:ext uri="{A12FA001-AC4F-418D-AE19-62706E023703}">
+                    <ahyp:hlinkClr xmlns:ahyp="http://schemas.microsoft.com/office/drawing/2018/hyperlinkcolor" val="tx"/>
+                  </a:ext>
+                </a:extLst>
+              </a:hlinkClick>
+            </a:endParaRPr>
+          </a:p>
+          <a:p>
             <a:r>
               <a:rPr lang="en-US" u="none" dirty="0">
                 <a:solidFill>
@@ -1518,7 +1793,38 @@
                   </a:extLst>
                 </a:hlinkClick>
               </a:rPr>
-              <a:t>The Microsoft Graph explorer is a tool that lets you make requests and see responses against the Microsoft Graph API. By default</a:t>
+              <a:t>The Microsoft Graph explorer is a web-based tool that lets us make requests and see responses against the Microsoft Graph API. </a:t>
+            </a:r>
+          </a:p>
+          <a:p>
+            <a:endParaRPr lang="en-US" u="none" dirty="0">
+              <a:solidFill>
+                <a:srgbClr val="0563C1"/>
+              </a:solidFill>
+              <a:hlinkClick r:id="rId3">
+                <a:extLst>
+                  <a:ext uri="{A12FA001-AC4F-418D-AE19-62706E023703}">
+                    <ahyp:hlinkClr xmlns:ahyp="http://schemas.microsoft.com/office/drawing/2018/hyperlinkcolor" val="tx"/>
+                  </a:ext>
+                </a:extLst>
+              </a:hlinkClick>
+            </a:endParaRPr>
+          </a:p>
+          <a:p>
+            <a:r>
+              <a:rPr lang="en-US" u="none" dirty="0">
+                <a:solidFill>
+                  <a:srgbClr val="0563C1"/>
+                </a:solidFill>
+                <a:hlinkClick r:id="rId3">
+                  <a:extLst>
+                    <a:ext uri="{A12FA001-AC4F-418D-AE19-62706E023703}">
+                      <ahyp:hlinkClr xmlns:ahyp="http://schemas.microsoft.com/office/drawing/2018/hyperlinkcolor" val="tx"/>
+                    </a:ext>
+                  </a:extLst>
+                </a:hlinkClick>
+              </a:rPr>
+              <a:t>By default</a:t>
             </a:r>
             <a:r>
               <a:rPr lang="en-US" u="none" dirty="0">
@@ -1533,7 +1839,7 @@
                   </a:extLst>
                 </a:hlinkClick>
               </a:rPr>
-              <a:t> is uses a sample tenant that is filled with sample data you can work against, but you can also sign in and work with data from your tenant. </a:t>
+              <a:t> is uses a sample tenant that is filled with test data, but we can also sign in and work with data from our own tenant. </a:t>
             </a:r>
           </a:p>
           <a:p>
@@ -1564,11 +1870,52 @@
                   </a:extLst>
                 </a:hlinkClick>
               </a:rPr>
-              <a:t>List users - Microsoft Graph v1.0 | Microsoft Docs</a:t>
-            </a:r>
-            <a:r>
-              <a:rPr lang="en-US" dirty="0"/>
-              <a:t> </a:t>
+              <a:t>We can access the Graph Explorer by going to aka.ms/GE</a:t>
+            </a:r>
+          </a:p>
+          <a:p>
+            <a:endParaRPr lang="en-US" dirty="0">
+              <a:solidFill>
+                <a:srgbClr val="0563C1"/>
+              </a:solidFill>
+              <a:hlinkClick r:id="rId3">
+                <a:extLst>
+                  <a:ext uri="{A12FA001-AC4F-418D-AE19-62706E023703}">
+                    <ahyp:hlinkClr xmlns:ahyp="http://schemas.microsoft.com/office/drawing/2018/hyperlinkcolor" val="tx"/>
+                  </a:ext>
+                </a:extLst>
+              </a:hlinkClick>
+            </a:endParaRPr>
+          </a:p>
+          <a:p>
+            <a:endParaRPr lang="en-US" dirty="0">
+              <a:solidFill>
+                <a:srgbClr val="0563C1"/>
+              </a:solidFill>
+              <a:hlinkClick r:id="rId3">
+                <a:extLst>
+                  <a:ext uri="{A12FA001-AC4F-418D-AE19-62706E023703}">
+                    <ahyp:hlinkClr xmlns:ahyp="http://schemas.microsoft.com/office/drawing/2018/hyperlinkcolor" val="tx"/>
+                  </a:ext>
+                </a:extLst>
+              </a:hlinkClick>
+            </a:endParaRPr>
+          </a:p>
+          <a:p>
+            <a:r>
+              <a:rPr lang="en-US" dirty="0">
+                <a:solidFill>
+                  <a:srgbClr val="0563C1"/>
+                </a:solidFill>
+                <a:hlinkClick r:id="rId3">
+                  <a:extLst>
+                    <a:ext uri="{A12FA001-AC4F-418D-AE19-62706E023703}">
+                      <ahyp:hlinkClr xmlns:ahyp="http://schemas.microsoft.com/office/drawing/2018/hyperlinkcolor" val="tx"/>
+                    </a:ext>
+                  </a:extLst>
+                </a:hlinkClick>
+              </a:rPr>
+              <a:t>GO AND DO "GET TASK LISTS IN TO DO"</a:t>
             </a:r>
           </a:p>
         </p:txBody>
@@ -1654,69 +2001,43 @@
           <a:lstStyle/>
           <a:p>
             <a:r>
-              <a:rPr lang="en-US" u="none" dirty="0">
-                <a:solidFill>
-                  <a:srgbClr val="0563C1"/>
-                </a:solidFill>
-                <a:hlinkClick r:id="rId3">
-                  <a:extLst>
-                    <a:ext uri="{A12FA001-AC4F-418D-AE19-62706E023703}">
-                      <ahyp:hlinkClr xmlns:ahyp="http://schemas.microsoft.com/office/drawing/2018/hyperlinkcolor" val="tx"/>
-                    </a:ext>
-                  </a:extLst>
-                </a:hlinkClick>
-              </a:rPr>
-              <a:t>The Microsoft Graph explorer is a tool that lets you make requests and see responses against the Microsoft Graph API. By default</a:t>
-            </a:r>
-            <a:r>
-              <a:rPr lang="en-US" u="none" dirty="0">
-                <a:solidFill>
-                  <a:schemeClr val="tx1"/>
-                </a:solidFill>
-                <a:hlinkClick r:id="rId3">
-                  <a:extLst>
-                    <a:ext uri="{A12FA001-AC4F-418D-AE19-62706E023703}">
-                      <ahyp:hlinkClr xmlns:ahyp="http://schemas.microsoft.com/office/drawing/2018/hyperlinkcolor" val="tx"/>
-                    </a:ext>
-                  </a:extLst>
-                </a:hlinkClick>
-              </a:rPr>
-              <a:t> is uses a sample tenant that is filled with sample data you can work against, but you can also sign in and work with data from your tenant. </a:t>
-            </a:r>
-          </a:p>
-          <a:p>
-            <a:endParaRPr lang="en-US" dirty="0">
-              <a:solidFill>
-                <a:srgbClr val="0563C1"/>
-              </a:solidFill>
-              <a:hlinkClick r:id="rId3">
-                <a:extLst>
-                  <a:ext uri="{A12FA001-AC4F-418D-AE19-62706E023703}">
-                    <ahyp:hlinkClr xmlns:ahyp="http://schemas.microsoft.com/office/drawing/2018/hyperlinkcolor" val="tx"/>
-                  </a:ext>
-                </a:extLst>
-              </a:hlinkClick>
-            </a:endParaRPr>
-          </a:p>
-          <a:p>
-            <a:r>
-              <a:rPr lang="en-US" dirty="0">
-                <a:solidFill>
-                  <a:srgbClr val="0563C1"/>
-                </a:solidFill>
-                <a:hlinkClick r:id="rId3">
-                  <a:extLst>
-                    <a:ext uri="{A12FA001-AC4F-418D-AE19-62706E023703}">
-                      <ahyp:hlinkClr xmlns:ahyp="http://schemas.microsoft.com/office/drawing/2018/hyperlinkcolor" val="tx"/>
-                    </a:ext>
-                  </a:extLst>
-                </a:hlinkClick>
-              </a:rPr>
-              <a:t>List users - Microsoft Graph v1.0 | Microsoft Docs</a:t>
-            </a:r>
-            <a:r>
               <a:rPr lang="en-US" dirty="0"/>
-              <a:t> </a:t>
+              <a:t>Next, we have the PowerShell SDK</a:t>
+            </a:r>
+          </a:p>
+          <a:p>
+            <a:endParaRPr lang="en-US" dirty="0"/>
+          </a:p>
+          <a:p>
+            <a:r>
+              <a:rPr lang="en-US" dirty="0"/>
+              <a:t>The SDK provides a more </a:t>
+            </a:r>
+            <a:r>
+              <a:rPr lang="en-US" dirty="0" err="1"/>
+              <a:t>powershell</a:t>
+            </a:r>
+            <a:r>
+              <a:rPr lang="en-US" dirty="0"/>
+              <a:t> friendly way to connect and work within Microsoft Graph</a:t>
+            </a:r>
+          </a:p>
+          <a:p>
+            <a:endParaRPr lang="en-US" dirty="0"/>
+          </a:p>
+          <a:p>
+            <a:r>
+              <a:rPr lang="en-US" dirty="0"/>
+              <a:t>Instead of having to deal with endpoints and API query parameters, we are working with more friendly PowerShell syntax like parameters and cmdlets that do most of the heavy lifting behind the scenes for us. </a:t>
+            </a:r>
+          </a:p>
+          <a:p>
+            <a:endParaRPr lang="en-US" dirty="0"/>
+          </a:p>
+          <a:p>
+            <a:r>
+              <a:rPr lang="en-US" dirty="0"/>
+              <a:t>The SDK cmdlets all have a prefix of MG, this was chosen so none of the cmdlets clashed with any others from other PowerShell modules. </a:t>
             </a:r>
           </a:p>
         </p:txBody>
@@ -1806,66 +2127,142 @@
                 <a:solidFill>
                   <a:srgbClr val="0563C1"/>
                 </a:solidFill>
-                <a:hlinkClick r:id="rId3">
-                  <a:extLst>
-                    <a:ext uri="{A12FA001-AC4F-418D-AE19-62706E023703}">
-                      <ahyp:hlinkClr xmlns:ahyp="http://schemas.microsoft.com/office/drawing/2018/hyperlinkcolor" val="tx"/>
-                    </a:ext>
-                  </a:extLst>
-                </a:hlinkClick>
               </a:rPr>
-              <a:t>The Microsoft Graph explorer is a tool that lets you make requests and see responses against the Microsoft Graph API. By default</a:t>
+              <a:t>A more traditional method of connecting and working with APIs is Invoke-</a:t>
+            </a:r>
+            <a:r>
+              <a:rPr lang="en-US" u="none" dirty="0" err="1">
+                <a:solidFill>
+                  <a:srgbClr val="0563C1"/>
+                </a:solidFill>
+              </a:rPr>
+              <a:t>RestMethod</a:t>
             </a:r>
             <a:r>
               <a:rPr lang="en-US" u="none" dirty="0">
                 <a:solidFill>
-                  <a:schemeClr val="tx1"/>
+                  <a:srgbClr val="0563C1"/>
                 </a:solidFill>
-                <a:hlinkClick r:id="rId3">
-                  <a:extLst>
-                    <a:ext uri="{A12FA001-AC4F-418D-AE19-62706E023703}">
-                      <ahyp:hlinkClr xmlns:ahyp="http://schemas.microsoft.com/office/drawing/2018/hyperlinkcolor" val="tx"/>
-                    </a:ext>
-                  </a:extLst>
-                </a:hlinkClick>
               </a:rPr>
-              <a:t> is uses a sample tenant that is filled with sample data you can work against, but you can also sign in and work with data from your tenant. </a:t>
-            </a:r>
-          </a:p>
-          <a:p>
-            <a:endParaRPr lang="en-US" dirty="0">
+              <a:t>. </a:t>
+            </a:r>
+          </a:p>
+          <a:p>
+            <a:endParaRPr lang="en-US" u="none" dirty="0">
               <a:solidFill>
                 <a:srgbClr val="0563C1"/>
               </a:solidFill>
-              <a:hlinkClick r:id="rId3">
-                <a:extLst>
-                  <a:ext uri="{A12FA001-AC4F-418D-AE19-62706E023703}">
-                    <ahyp:hlinkClr xmlns:ahyp="http://schemas.microsoft.com/office/drawing/2018/hyperlinkcolor" val="tx"/>
-                  </a:ext>
-                </a:extLst>
-              </a:hlinkClick>
             </a:endParaRPr>
           </a:p>
           <a:p>
             <a:r>
-              <a:rPr lang="en-US" dirty="0">
+              <a:rPr lang="en-US" u="none" dirty="0">
                 <a:solidFill>
                   <a:srgbClr val="0563C1"/>
                 </a:solidFill>
-                <a:hlinkClick r:id="rId3">
-                  <a:extLst>
-                    <a:ext uri="{A12FA001-AC4F-418D-AE19-62706E023703}">
-                      <ahyp:hlinkClr xmlns:ahyp="http://schemas.microsoft.com/office/drawing/2018/hyperlinkcolor" val="tx"/>
-                    </a:ext>
-                  </a:extLst>
-                </a:hlinkClick>
               </a:rPr>
-              <a:t>List users - Microsoft Graph v1.0 | Microsoft Docs</a:t>
-            </a:r>
-            <a:r>
-              <a:rPr lang="en-US" dirty="0"/>
-              <a:t> </a:t>
-            </a:r>
+              <a:t>A benefit of using Invoke-</a:t>
+            </a:r>
+            <a:r>
+              <a:rPr lang="en-US" u="none" dirty="0" err="1">
+                <a:solidFill>
+                  <a:srgbClr val="0563C1"/>
+                </a:solidFill>
+              </a:rPr>
+              <a:t>RestMethod</a:t>
+            </a:r>
+            <a:r>
+              <a:rPr lang="en-US" u="none" dirty="0">
+                <a:solidFill>
+                  <a:srgbClr val="0563C1"/>
+                </a:solidFill>
+              </a:rPr>
+              <a:t> cmdlet is Once you learn how to use Invoke-</a:t>
+            </a:r>
+            <a:r>
+              <a:rPr lang="en-US" u="none" dirty="0" err="1">
+                <a:solidFill>
+                  <a:srgbClr val="0563C1"/>
+                </a:solidFill>
+              </a:rPr>
+              <a:t>RestMethod</a:t>
+            </a:r>
+            <a:r>
+              <a:rPr lang="en-US" u="none" dirty="0">
+                <a:solidFill>
+                  <a:srgbClr val="0563C1"/>
+                </a:solidFill>
+              </a:rPr>
+              <a:t>, you can use it on other RESTful API’s. No need to figure out what cmdlets to use or parameters like with an SDK. </a:t>
+            </a:r>
+          </a:p>
+          <a:p>
+            <a:endParaRPr lang="en-US" u="none" dirty="0">
+              <a:solidFill>
+                <a:srgbClr val="0563C1"/>
+              </a:solidFill>
+            </a:endParaRPr>
+          </a:p>
+          <a:p>
+            <a:r>
+              <a:rPr lang="en-US" u="none" dirty="0">
+                <a:solidFill>
+                  <a:srgbClr val="0563C1"/>
+                </a:solidFill>
+              </a:rPr>
+              <a:t>You Just need to look at the endpoints and permissions required</a:t>
+            </a:r>
+          </a:p>
+          <a:p>
+            <a:endParaRPr lang="en-US" u="none" dirty="0">
+              <a:solidFill>
+                <a:srgbClr val="0563C1"/>
+              </a:solidFill>
+            </a:endParaRPr>
+          </a:p>
+          <a:p>
+            <a:r>
+              <a:rPr lang="en-US" u="none" dirty="0">
+                <a:solidFill>
+                  <a:srgbClr val="0563C1"/>
+                </a:solidFill>
+              </a:rPr>
+              <a:t>When new items are added to the API you </a:t>
+            </a:r>
+            <a:r>
+              <a:rPr lang="en-US" u="none" dirty="0" err="1">
+                <a:solidFill>
+                  <a:srgbClr val="0563C1"/>
+                </a:solidFill>
+              </a:rPr>
+              <a:t>dont</a:t>
+            </a:r>
+            <a:r>
+              <a:rPr lang="en-US" u="none" dirty="0">
+                <a:solidFill>
+                  <a:srgbClr val="0563C1"/>
+                </a:solidFill>
+              </a:rPr>
+              <a:t> need to wait for the SDK to finish adding the new functionality and rolling it out. You can begin working with it immediately. </a:t>
+            </a:r>
+          </a:p>
+          <a:p>
+            <a:endParaRPr lang="en-US" u="none" dirty="0">
+              <a:solidFill>
+                <a:srgbClr val="0563C1"/>
+              </a:solidFill>
+            </a:endParaRPr>
+          </a:p>
+          <a:p>
+            <a:r>
+              <a:rPr lang="en-US" u="none" dirty="0">
+                <a:solidFill>
+                  <a:srgbClr val="0563C1"/>
+                </a:solidFill>
+              </a:rPr>
+              <a:t>And with that, lets get started on a demo and dig into the actual code!</a:t>
+            </a:r>
+            <a:endParaRPr lang="en-US" dirty="0"/>
           </a:p>
         </p:txBody>
       </p:sp>
@@ -1896,6 +2293,90 @@
     <p:extLst>
       <p:ext uri="{BB962C8B-B14F-4D97-AF65-F5344CB8AC3E}">
         <p14:creationId xmlns:p14="http://schemas.microsoft.com/office/powerpoint/2010/main" val="576865506"/>
+      </p:ext>
+    </p:extLst>
+  </p:cSld>
+  <p:clrMapOvr>
+    <a:masterClrMapping/>
+  </p:clrMapOvr>
+</p:notes>
+</file>
+
+<file path=ppt/notesSlides/notesSlide9.xml><?xml version="1.0" encoding="utf-8"?>
+<p:notes xmlns:a="http://schemas.openxmlformats.org/drawingml/2006/main" xmlns:r="http://schemas.openxmlformats.org/officeDocument/2006/relationships" xmlns:p="http://schemas.openxmlformats.org/presentationml/2006/main">
+  <p:cSld>
+    <p:spTree>
+      <p:nvGrpSpPr>
+        <p:cNvPr id="1" name=""/>
+        <p:cNvGrpSpPr/>
+        <p:nvPr/>
+      </p:nvGrpSpPr>
+      <p:grpSpPr>
+        <a:xfrm>
+          <a:off x="0" y="0"/>
+          <a:ext cx="0" cy="0"/>
+          <a:chOff x="0" y="0"/>
+          <a:chExt cx="0" cy="0"/>
+        </a:xfrm>
+      </p:grpSpPr>
+      <p:sp>
+        <p:nvSpPr>
+          <p:cNvPr id="2" name="Slide Image Placeholder 1"/>
+          <p:cNvSpPr>
+            <a:spLocks noGrp="1" noRot="1" noChangeAspect="1"/>
+          </p:cNvSpPr>
+          <p:nvPr>
+            <p:ph type="sldImg"/>
+          </p:nvPr>
+        </p:nvSpPr>
+        <p:spPr/>
+      </p:sp>
+      <p:sp>
+        <p:nvSpPr>
+          <p:cNvPr id="3" name="Notes Placeholder 2"/>
+          <p:cNvSpPr>
+            <a:spLocks noGrp="1"/>
+          </p:cNvSpPr>
+          <p:nvPr>
+            <p:ph type="body" idx="1"/>
+          </p:nvPr>
+        </p:nvSpPr>
+        <p:spPr/>
+        <p:txBody>
+          <a:bodyPr/>
+          <a:lstStyle/>
+          <a:p>
+            <a:endParaRPr lang="en-US" dirty="0"/>
+          </a:p>
+        </p:txBody>
+      </p:sp>
+      <p:sp>
+        <p:nvSpPr>
+          <p:cNvPr id="4" name="Slide Number Placeholder 3"/>
+          <p:cNvSpPr>
+            <a:spLocks noGrp="1"/>
+          </p:cNvSpPr>
+          <p:nvPr>
+            <p:ph type="sldNum" sz="quarter" idx="5"/>
+          </p:nvPr>
+        </p:nvSpPr>
+        <p:spPr/>
+        <p:txBody>
+          <a:bodyPr/>
+          <a:lstStyle/>
+          <a:p>
+            <a:fld id="{CE90C867-5C94-4B47-880B-A8B69EB830B0}" type="slidenum">
+              <a:rPr lang="en-US" smtClean="0"/>
+              <a:t>9</a:t>
+            </a:fld>
+            <a:endParaRPr lang="en-US"/>
+          </a:p>
+        </p:txBody>
+      </p:sp>
+    </p:spTree>
+    <p:extLst>
+      <p:ext uri="{BB962C8B-B14F-4D97-AF65-F5344CB8AC3E}">
+        <p14:creationId xmlns:p14="http://schemas.microsoft.com/office/powerpoint/2010/main" val="1870709398"/>
       </p:ext>
     </p:extLst>
   </p:cSld>
@@ -2044,7 +2525,7 @@
           <a:p>
             <a:fld id="{48A87A34-81AB-432B-8DAE-1953F412C126}" type="datetimeFigureOut">
               <a:rPr lang="en-US" dirty="0"/>
-              <a:t>4/8/21</a:t>
+              <a:t>4/12/21</a:t>
             </a:fld>
             <a:endParaRPr lang="en-US" dirty="0"/>
           </a:p>
@@ -2250,7 +2731,7 @@
           <a:p>
             <a:fld id="{48A87A34-81AB-432B-8DAE-1953F412C126}" type="datetimeFigureOut">
               <a:rPr lang="en-US" dirty="0"/>
-              <a:t>4/8/21</a:t>
+              <a:t>4/12/21</a:t>
             </a:fld>
             <a:endParaRPr lang="en-US" dirty="0"/>
           </a:p>
@@ -2460,7 +2941,7 @@
           <a:p>
             <a:fld id="{48A87A34-81AB-432B-8DAE-1953F412C126}" type="datetimeFigureOut">
               <a:rPr lang="en-US" dirty="0"/>
-              <a:t>4/8/21</a:t>
+              <a:t>4/12/21</a:t>
             </a:fld>
             <a:endParaRPr lang="en-US" dirty="0"/>
           </a:p>
@@ -2656,7 +3137,7 @@
           <a:p>
             <a:fld id="{48A87A34-81AB-432B-8DAE-1953F412C126}" type="datetimeFigureOut">
               <a:rPr lang="en-US" dirty="0"/>
-              <a:t>4/8/21</a:t>
+              <a:t>4/12/21</a:t>
             </a:fld>
             <a:endParaRPr lang="en-US" dirty="0"/>
           </a:p>
@@ -2930,7 +3411,7 @@
           <a:p>
             <a:fld id="{48A87A34-81AB-432B-8DAE-1953F412C126}" type="datetimeFigureOut">
               <a:rPr lang="en-US" dirty="0"/>
-              <a:t>4/8/21</a:t>
+              <a:t>4/12/21</a:t>
             </a:fld>
             <a:endParaRPr lang="en-US" dirty="0"/>
           </a:p>
@@ -3193,7 +3674,7 @@
           <a:p>
             <a:fld id="{48A87A34-81AB-432B-8DAE-1953F412C126}" type="datetimeFigureOut">
               <a:rPr lang="en-US" dirty="0"/>
-              <a:t>4/8/21</a:t>
+              <a:t>4/12/21</a:t>
             </a:fld>
             <a:endParaRPr lang="en-US" dirty="0"/>
           </a:p>
@@ -3604,7 +4085,7 @@
           <a:p>
             <a:fld id="{48A87A34-81AB-432B-8DAE-1953F412C126}" type="datetimeFigureOut">
               <a:rPr lang="en-US" dirty="0"/>
-              <a:t>4/8/21</a:t>
+              <a:t>4/12/21</a:t>
             </a:fld>
             <a:endParaRPr lang="en-US" dirty="0"/>
           </a:p>
@@ -3748,7 +4229,7 @@
           <a:p>
             <a:fld id="{48A87A34-81AB-432B-8DAE-1953F412C126}" type="datetimeFigureOut">
               <a:rPr lang="en-US" dirty="0"/>
-              <a:t>4/8/21</a:t>
+              <a:t>4/12/21</a:t>
             </a:fld>
             <a:endParaRPr lang="en-US" dirty="0"/>
           </a:p>
@@ -3869,7 +4350,7 @@
           <a:p>
             <a:fld id="{48A87A34-81AB-432B-8DAE-1953F412C126}" type="datetimeFigureOut">
               <a:rPr lang="en-US" dirty="0"/>
-              <a:t>4/8/21</a:t>
+              <a:t>4/12/21</a:t>
             </a:fld>
             <a:endParaRPr lang="en-US" dirty="0"/>
           </a:p>
@@ -4115,7 +4596,7 @@
           <a:p>
             <a:fld id="{48A87A34-81AB-432B-8DAE-1953F412C126}" type="datetimeFigureOut">
               <a:rPr lang="en-US" dirty="0"/>
-              <a:t>4/8/21</a:t>
+              <a:t>4/12/21</a:t>
             </a:fld>
             <a:endParaRPr lang="en-US" dirty="0"/>
           </a:p>
@@ -4556,7 +5037,7 @@
             <a:fld id="{48A87A34-81AB-432B-8DAE-1953F412C126}" type="datetimeFigureOut">
               <a:rPr lang="en-US" dirty="0"/>
               <a:pPr/>
-              <a:t>4/8/21</a:t>
+              <a:t>4/12/21</a:t>
             </a:fld>
             <a:endParaRPr lang="en-US" dirty="0"/>
           </a:p>
@@ -4831,7 +5312,7 @@
             <a:fld id="{48A87A34-81AB-432B-8DAE-1953F412C126}" type="datetimeFigureOut">
               <a:rPr lang="en-US" dirty="0"/>
               <a:pPr/>
-              <a:t>4/8/21</a:t>
+              <a:t>4/12/21</a:t>
             </a:fld>
             <a:endParaRPr lang="en-US" dirty="0"/>
           </a:p>
@@ -5735,58 +6216,284 @@
       </p:grpSpPr>
       <p:sp>
         <p:nvSpPr>
-          <p:cNvPr id="2" name="Title 1">
+          <p:cNvPr id="7" name="Rectangle 6">
             <a:extLst>
               <a:ext uri="{FF2B5EF4-FFF2-40B4-BE49-F238E27FC236}">
-                <a16:creationId xmlns:a16="http://schemas.microsoft.com/office/drawing/2014/main" id="{D20E2FE3-FA5E-944B-BE51-5C95E1242D44}"/>
+                <a16:creationId xmlns:a16="http://schemas.microsoft.com/office/drawing/2014/main" id="{D9DB61D5-B9B5-4E96-A2E9-70AE3404BD6B}"/>
               </a:ext>
             </a:extLst>
           </p:cNvPr>
-          <p:cNvSpPr>
-            <a:spLocks noGrp="1"/>
-          </p:cNvSpPr>
-          <p:nvPr>
-            <p:ph type="title"/>
-          </p:nvPr>
-        </p:nvSpPr>
-        <p:spPr/>
-        <p:txBody>
-          <a:bodyPr/>
-          <a:lstStyle/>
-          <a:p>
-            <a:endParaRPr lang="en-US"/>
-          </a:p>
-        </p:txBody>
-      </p:sp>
-      <p:sp>
-        <p:nvSpPr>
-          <p:cNvPr id="3" name="Content Placeholder 2">
+          <p:cNvSpPr/>
+          <p:nvPr/>
+        </p:nvSpPr>
+        <p:spPr>
+          <a:xfrm>
+            <a:off x="-5927" y="12700"/>
+            <a:ext cx="12197927" cy="6118563"/>
+          </a:xfrm>
+          <a:prstGeom prst="rect">
+            <a:avLst/>
+          </a:prstGeom>
+          <a:solidFill>
+            <a:schemeClr val="bg1"/>
+          </a:solidFill>
+          <a:ln>
+            <a:solidFill>
+              <a:schemeClr val="bg1"/>
+            </a:solidFill>
+          </a:ln>
+        </p:spPr>
+        <p:style>
+          <a:lnRef idx="2">
+            <a:schemeClr val="accent1">
+              <a:shade val="50000"/>
+            </a:schemeClr>
+          </a:lnRef>
+          <a:fillRef idx="1">
+            <a:schemeClr val="accent1"/>
+          </a:fillRef>
+          <a:effectRef idx="0">
+            <a:schemeClr val="accent1"/>
+          </a:effectRef>
+          <a:fontRef idx="minor">
+            <a:schemeClr val="lt1"/>
+          </a:fontRef>
+        </p:style>
+        <p:txBody>
+          <a:bodyPr rtlCol="0" anchor="ctr"/>
+          <a:lstStyle/>
+          <a:p>
+            <a:pPr algn="ctr"/>
+            <a:endParaRPr lang="en-US" sz="5400" dirty="0">
+              <a:solidFill>
+                <a:schemeClr val="tx1"/>
+              </a:solidFill>
+            </a:endParaRPr>
+          </a:p>
+        </p:txBody>
+      </p:sp>
+      <p:sp>
+        <p:nvSpPr>
+          <p:cNvPr id="5" name="TextBox 4">
             <a:extLst>
               <a:ext uri="{FF2B5EF4-FFF2-40B4-BE49-F238E27FC236}">
-                <a16:creationId xmlns:a16="http://schemas.microsoft.com/office/drawing/2014/main" id="{F21D6FE0-48F0-024A-A43E-584186BA4CE9}"/>
+                <a16:creationId xmlns:a16="http://schemas.microsoft.com/office/drawing/2014/main" id="{E38CC932-1CEC-A34A-AEE3-809B20EAB580}"/>
               </a:ext>
             </a:extLst>
           </p:cNvPr>
-          <p:cNvSpPr>
-            <a:spLocks noGrp="1"/>
-          </p:cNvSpPr>
-          <p:nvPr>
-            <p:ph idx="1"/>
-          </p:nvPr>
-        </p:nvSpPr>
-        <p:spPr/>
-        <p:txBody>
-          <a:bodyPr/>
-          <a:lstStyle/>
-          <a:p>
-            <a:endParaRPr lang="en-US"/>
-          </a:p>
-        </p:txBody>
-      </p:sp>
+          <p:cNvSpPr txBox="1"/>
+          <p:nvPr/>
+        </p:nvSpPr>
+        <p:spPr>
+          <a:xfrm>
+            <a:off x="496364" y="504437"/>
+            <a:ext cx="8253935" cy="470000"/>
+          </a:xfrm>
+          <a:prstGeom prst="rect">
+            <a:avLst/>
+          </a:prstGeom>
+          <a:noFill/>
+        </p:spPr>
+        <p:txBody>
+          <a:bodyPr wrap="square" rtlCol="0">
+            <a:spAutoFit/>
+          </a:bodyPr>
+          <a:lstStyle/>
+          <a:p>
+            <a:pPr>
+              <a:lnSpc>
+                <a:spcPts val="2360"/>
+              </a:lnSpc>
+            </a:pPr>
+            <a:r>
+              <a:rPr lang="en-US" sz="4800" dirty="0">
+                <a:solidFill>
+                  <a:schemeClr val="tx1">
+                    <a:lumMod val="85000"/>
+                    <a:lumOff val="15000"/>
+                  </a:schemeClr>
+                </a:solidFill>
+              </a:rPr>
+              <a:t>Connect</a:t>
+            </a:r>
+            <a:endParaRPr lang="en-US" sz="4400" dirty="0">
+              <a:solidFill>
+                <a:schemeClr val="tx1">
+                  <a:lumMod val="75000"/>
+                  <a:lumOff val="25000"/>
+                </a:schemeClr>
+              </a:solidFill>
+            </a:endParaRPr>
+          </a:p>
+        </p:txBody>
+      </p:sp>
+      <p:sp>
+        <p:nvSpPr>
+          <p:cNvPr id="4" name="TextBox 3">
+            <a:extLst>
+              <a:ext uri="{FF2B5EF4-FFF2-40B4-BE49-F238E27FC236}">
+                <a16:creationId xmlns:a16="http://schemas.microsoft.com/office/drawing/2014/main" id="{D8F0A0B8-9CFB-9B48-91E4-43268E2C4D55}"/>
+              </a:ext>
+            </a:extLst>
+          </p:cNvPr>
+          <p:cNvSpPr txBox="1"/>
+          <p:nvPr/>
+        </p:nvSpPr>
+        <p:spPr>
+          <a:xfrm>
+            <a:off x="3396300" y="1327128"/>
+            <a:ext cx="8451224" cy="2346348"/>
+          </a:xfrm>
+          <a:prstGeom prst="rect">
+            <a:avLst/>
+          </a:prstGeom>
+          <a:noFill/>
+        </p:spPr>
+        <p:txBody>
+          <a:bodyPr wrap="square" rtlCol="0">
+            <a:spAutoFit/>
+          </a:bodyPr>
+          <a:lstStyle/>
+          <a:p>
+            <a:pPr marL="285750" indent="-285750">
+              <a:lnSpc>
+                <a:spcPct val="150000"/>
+              </a:lnSpc>
+              <a:buFont typeface="Arial" panose="020B0604020202020204" pitchFamily="34" charset="0"/>
+              <a:buChar char="•"/>
+            </a:pPr>
+            <a:r>
+              <a:rPr lang="en-US" sz="2000" b="1" dirty="0"/>
+              <a:t>GitHub:  </a:t>
+            </a:r>
+            <a:r>
+              <a:rPr lang="en-US" sz="2000" dirty="0" err="1"/>
+              <a:t>github.com</a:t>
+            </a:r>
+            <a:r>
+              <a:rPr lang="en-US" sz="2000" dirty="0"/>
+              <a:t>/bwya77/</a:t>
+            </a:r>
+            <a:r>
+              <a:rPr lang="en-US" sz="2000" dirty="0" err="1"/>
+              <a:t>PowerShellSummit</a:t>
+            </a:r>
+            <a:endParaRPr lang="en-US" sz="2000" dirty="0"/>
+          </a:p>
+          <a:p>
+            <a:pPr marL="285750" indent="-285750">
+              <a:lnSpc>
+                <a:spcPct val="150000"/>
+              </a:lnSpc>
+              <a:buFont typeface="Arial" panose="020B0604020202020204" pitchFamily="34" charset="0"/>
+              <a:buChar char="•"/>
+            </a:pPr>
+            <a:r>
+              <a:rPr lang="en-US" sz="2000" b="1" dirty="0"/>
+              <a:t>Twitter:  </a:t>
+            </a:r>
+            <a:r>
+              <a:rPr lang="en-US" sz="2000" dirty="0"/>
+              <a:t>@bwya77</a:t>
+            </a:r>
+          </a:p>
+          <a:p>
+            <a:pPr marL="285750" indent="-285750">
+              <a:lnSpc>
+                <a:spcPct val="150000"/>
+              </a:lnSpc>
+              <a:buFont typeface="Arial" panose="020B0604020202020204" pitchFamily="34" charset="0"/>
+              <a:buChar char="•"/>
+            </a:pPr>
+            <a:r>
+              <a:rPr lang="en-US" sz="2000" b="1" dirty="0"/>
+              <a:t>Blog:  </a:t>
+            </a:r>
+            <a:r>
+              <a:rPr lang="en-US" sz="2000" dirty="0" err="1"/>
+              <a:t>TheLazyAdministrator.com</a:t>
+            </a:r>
+            <a:endParaRPr lang="en-US" sz="2000" dirty="0"/>
+          </a:p>
+          <a:p>
+            <a:pPr marL="285750" indent="-285750">
+              <a:lnSpc>
+                <a:spcPct val="150000"/>
+              </a:lnSpc>
+              <a:buFont typeface="Arial" panose="020B0604020202020204" pitchFamily="34" charset="0"/>
+              <a:buChar char="•"/>
+            </a:pPr>
+            <a:r>
+              <a:rPr lang="en-US" sz="2000" b="1" dirty="0"/>
+              <a:t>Email:  </a:t>
+            </a:r>
+            <a:r>
+              <a:rPr lang="en-US" sz="2000" dirty="0" err="1"/>
+              <a:t>brad@thelazyadministrator.com</a:t>
+            </a:r>
+            <a:endParaRPr lang="en-US" sz="2000" dirty="0"/>
+          </a:p>
+          <a:p>
+            <a:pPr>
+              <a:lnSpc>
+                <a:spcPct val="150000"/>
+              </a:lnSpc>
+            </a:pPr>
+            <a:endParaRPr lang="en-US" sz="2000" dirty="0"/>
+          </a:p>
+        </p:txBody>
+      </p:sp>
+      <p:pic>
+        <p:nvPicPr>
+          <p:cNvPr id="1026" name="Picture 2">
+            <a:extLst>
+              <a:ext uri="{FF2B5EF4-FFF2-40B4-BE49-F238E27FC236}">
+                <a16:creationId xmlns:a16="http://schemas.microsoft.com/office/drawing/2014/main" id="{6E734A9C-BC65-9146-BC24-13D001CE9167}"/>
+              </a:ext>
+            </a:extLst>
+          </p:cNvPr>
+          <p:cNvPicPr>
+            <a:picLocks noChangeAspect="1" noChangeArrowheads="1"/>
+          </p:cNvPicPr>
+          <p:nvPr/>
+        </p:nvPicPr>
+        <p:blipFill>
+          <a:blip r:embed="rId3">
+            <a:extLst>
+              <a:ext uri="{28A0092B-C50C-407E-A947-70E740481C1C}">
+                <a14:useLocalDpi xmlns:a14="http://schemas.microsoft.com/office/drawing/2010/main" val="0"/>
+              </a:ext>
+            </a:extLst>
+          </a:blip>
+          <a:srcRect/>
+          <a:stretch>
+            <a:fillRect/>
+          </a:stretch>
+        </p:blipFill>
+        <p:spPr bwMode="auto">
+          <a:xfrm>
+            <a:off x="656821" y="1327128"/>
+            <a:ext cx="2634624" cy="2634624"/>
+          </a:xfrm>
+          <a:prstGeom prst="rect">
+            <a:avLst/>
+          </a:prstGeom>
+          <a:noFill/>
+          <a:extLst>
+            <a:ext uri="{909E8E84-426E-40DD-AFC4-6F175D3DCCD1}">
+              <a14:hiddenFill xmlns:a14="http://schemas.microsoft.com/office/drawing/2010/main">
+                <a:solidFill>
+                  <a:srgbClr val="FFFFFF"/>
+                </a:solidFill>
+              </a14:hiddenFill>
+            </a:ext>
+          </a:extLst>
+        </p:spPr>
+      </p:pic>
     </p:spTree>
     <p:extLst>
       <p:ext uri="{BB962C8B-B14F-4D97-AF65-F5344CB8AC3E}">
-        <p14:creationId xmlns:p14="http://schemas.microsoft.com/office/powerpoint/2010/main" val="1081554031"/>
+        <p14:creationId xmlns:p14="http://schemas.microsoft.com/office/powerpoint/2010/main" val="3279216192"/>
       </p:ext>
     </p:extLst>
   </p:cSld>
@@ -5815,58 +6522,121 @@
       </p:grpSpPr>
       <p:sp>
         <p:nvSpPr>
-          <p:cNvPr id="2" name="Title 1">
+          <p:cNvPr id="7" name="Rectangle 6">
             <a:extLst>
               <a:ext uri="{FF2B5EF4-FFF2-40B4-BE49-F238E27FC236}">
-                <a16:creationId xmlns:a16="http://schemas.microsoft.com/office/drawing/2014/main" id="{7A4DA4AD-C229-074E-8908-BC710AA7644F}"/>
+                <a16:creationId xmlns:a16="http://schemas.microsoft.com/office/drawing/2014/main" id="{D9DB61D5-B9B5-4E96-A2E9-70AE3404BD6B}"/>
               </a:ext>
             </a:extLst>
           </p:cNvPr>
-          <p:cNvSpPr>
-            <a:spLocks noGrp="1"/>
-          </p:cNvSpPr>
-          <p:nvPr>
-            <p:ph type="title"/>
-          </p:nvPr>
-        </p:nvSpPr>
-        <p:spPr/>
-        <p:txBody>
-          <a:bodyPr/>
-          <a:lstStyle/>
-          <a:p>
-            <a:endParaRPr lang="en-US"/>
-          </a:p>
-        </p:txBody>
-      </p:sp>
-      <p:sp>
-        <p:nvSpPr>
-          <p:cNvPr id="3" name="Content Placeholder 2">
+          <p:cNvSpPr/>
+          <p:nvPr/>
+        </p:nvSpPr>
+        <p:spPr>
+          <a:xfrm>
+            <a:off x="-5927" y="0"/>
+            <a:ext cx="12197927" cy="6115049"/>
+          </a:xfrm>
+          <a:prstGeom prst="rect">
+            <a:avLst/>
+          </a:prstGeom>
+          <a:solidFill>
+            <a:schemeClr val="bg1"/>
+          </a:solidFill>
+          <a:ln>
+            <a:solidFill>
+              <a:schemeClr val="bg1"/>
+            </a:solidFill>
+          </a:ln>
+        </p:spPr>
+        <p:style>
+          <a:lnRef idx="2">
+            <a:schemeClr val="accent1">
+              <a:shade val="50000"/>
+            </a:schemeClr>
+          </a:lnRef>
+          <a:fillRef idx="1">
+            <a:schemeClr val="accent1"/>
+          </a:fillRef>
+          <a:effectRef idx="0">
+            <a:schemeClr val="accent1"/>
+          </a:effectRef>
+          <a:fontRef idx="minor">
+            <a:schemeClr val="lt1"/>
+          </a:fontRef>
+        </p:style>
+        <p:txBody>
+          <a:bodyPr rtlCol="0" anchor="ctr"/>
+          <a:lstStyle/>
+          <a:p>
+            <a:pPr algn="ctr"/>
+            <a:endParaRPr lang="en-US" sz="5400" dirty="0">
+              <a:solidFill>
+                <a:schemeClr val="tx1"/>
+              </a:solidFill>
+            </a:endParaRPr>
+          </a:p>
+        </p:txBody>
+      </p:sp>
+      <p:sp>
+        <p:nvSpPr>
+          <p:cNvPr id="5" name="TextBox 4">
             <a:extLst>
               <a:ext uri="{FF2B5EF4-FFF2-40B4-BE49-F238E27FC236}">
-                <a16:creationId xmlns:a16="http://schemas.microsoft.com/office/drawing/2014/main" id="{A608DD93-BD43-5B4E-B55F-3A5680A1771A}"/>
+                <a16:creationId xmlns:a16="http://schemas.microsoft.com/office/drawing/2014/main" id="{E38CC932-1CEC-A34A-AEE3-809B20EAB580}"/>
               </a:ext>
             </a:extLst>
           </p:cNvPr>
-          <p:cNvSpPr>
-            <a:spLocks noGrp="1"/>
-          </p:cNvSpPr>
-          <p:nvPr>
-            <p:ph idx="1"/>
-          </p:nvPr>
-        </p:nvSpPr>
-        <p:spPr/>
-        <p:txBody>
-          <a:bodyPr/>
-          <a:lstStyle/>
-          <a:p>
-            <a:endParaRPr lang="en-US"/>
+          <p:cNvSpPr txBox="1"/>
+          <p:nvPr/>
+        </p:nvSpPr>
+        <p:spPr>
+          <a:xfrm>
+            <a:off x="3019245" y="2773600"/>
+            <a:ext cx="6147582" cy="567848"/>
+          </a:xfrm>
+          <a:prstGeom prst="rect">
+            <a:avLst/>
+          </a:prstGeom>
+          <a:noFill/>
+        </p:spPr>
+        <p:txBody>
+          <a:bodyPr wrap="square" rtlCol="0">
+            <a:spAutoFit/>
+          </a:bodyPr>
+          <a:lstStyle/>
+          <a:p>
+            <a:pPr>
+              <a:lnSpc>
+                <a:spcPts val="2360"/>
+              </a:lnSpc>
+            </a:pPr>
+            <a:r>
+              <a:rPr lang="en-US" sz="8000" dirty="0">
+                <a:solidFill>
+                  <a:schemeClr val="tx1">
+                    <a:lumMod val="85000"/>
+                    <a:lumOff val="15000"/>
+                  </a:schemeClr>
+                </a:solidFill>
+              </a:rPr>
+              <a:t>Thank You!</a:t>
+            </a:r>
+            <a:endParaRPr lang="en-US" sz="7200" dirty="0">
+              <a:solidFill>
+                <a:schemeClr val="tx1">
+                  <a:lumMod val="75000"/>
+                  <a:lumOff val="25000"/>
+                </a:schemeClr>
+              </a:solidFill>
+            </a:endParaRPr>
           </a:p>
         </p:txBody>
       </p:sp>
     </p:spTree>
     <p:extLst>
       <p:ext uri="{BB962C8B-B14F-4D97-AF65-F5344CB8AC3E}">
-        <p14:creationId xmlns:p14="http://schemas.microsoft.com/office/powerpoint/2010/main" val="4061433770"/>
+        <p14:creationId xmlns:p14="http://schemas.microsoft.com/office/powerpoint/2010/main" val="414926687"/>
       </p:ext>
     </p:extLst>
   </p:cSld>
@@ -8340,6 +9110,105 @@
           </a:p>
         </p:txBody>
       </p:sp>
+      <p:sp>
+        <p:nvSpPr>
+          <p:cNvPr id="4" name="TextBox 3">
+            <a:extLst>
+              <a:ext uri="{FF2B5EF4-FFF2-40B4-BE49-F238E27FC236}">
+                <a16:creationId xmlns:a16="http://schemas.microsoft.com/office/drawing/2014/main" id="{D8F0A0B8-9CFB-9B48-91E4-43268E2C4D55}"/>
+              </a:ext>
+            </a:extLst>
+          </p:cNvPr>
+          <p:cNvSpPr txBox="1"/>
+          <p:nvPr/>
+        </p:nvSpPr>
+        <p:spPr>
+          <a:xfrm>
+            <a:off x="749299" y="1270000"/>
+            <a:ext cx="10947401" cy="2808013"/>
+          </a:xfrm>
+          <a:prstGeom prst="rect">
+            <a:avLst/>
+          </a:prstGeom>
+          <a:noFill/>
+        </p:spPr>
+        <p:txBody>
+          <a:bodyPr wrap="square" rtlCol="0">
+            <a:spAutoFit/>
+          </a:bodyPr>
+          <a:lstStyle/>
+          <a:p>
+            <a:pPr marL="285750" indent="-285750">
+              <a:lnSpc>
+                <a:spcPct val="150000"/>
+              </a:lnSpc>
+              <a:buFont typeface="Arial" panose="020B0604020202020204" pitchFamily="34" charset="0"/>
+              <a:buChar char="•"/>
+            </a:pPr>
+            <a:r>
+              <a:rPr lang="en-US" sz="2000" dirty="0"/>
+              <a:t>Introduced in Windows PowerShell 3.0</a:t>
+            </a:r>
+          </a:p>
+          <a:p>
+            <a:pPr marL="285750" indent="-285750">
+              <a:lnSpc>
+                <a:spcPct val="150000"/>
+              </a:lnSpc>
+              <a:buFont typeface="Arial" panose="020B0604020202020204" pitchFamily="34" charset="0"/>
+              <a:buChar char="•"/>
+            </a:pPr>
+            <a:r>
+              <a:rPr lang="en-US" sz="2000" dirty="0"/>
+              <a:t>Can Interact with the API directly without having to wait for SDK updates</a:t>
+            </a:r>
+          </a:p>
+          <a:p>
+            <a:pPr marL="285750" indent="-285750">
+              <a:lnSpc>
+                <a:spcPct val="150000"/>
+              </a:lnSpc>
+              <a:buFont typeface="Arial" panose="020B0604020202020204" pitchFamily="34" charset="0"/>
+              <a:buChar char="•"/>
+            </a:pPr>
+            <a:r>
+              <a:rPr lang="en-US" sz="2000" dirty="0"/>
+              <a:t>Full detailed documentation with the API ref</a:t>
+            </a:r>
+          </a:p>
+          <a:p>
+            <a:pPr marL="285750" indent="-285750">
+              <a:lnSpc>
+                <a:spcPct val="150000"/>
+              </a:lnSpc>
+              <a:buFont typeface="Arial" panose="020B0604020202020204" pitchFamily="34" charset="0"/>
+              <a:buChar char="•"/>
+            </a:pPr>
+            <a:r>
+              <a:rPr lang="en-US" sz="2000" dirty="0"/>
+              <a:t>Converts JSON to friendly PowerShell Objects</a:t>
+            </a:r>
+          </a:p>
+          <a:p>
+            <a:pPr marL="285750" indent="-285750">
+              <a:lnSpc>
+                <a:spcPct val="150000"/>
+              </a:lnSpc>
+              <a:buFont typeface="Arial" panose="020B0604020202020204" pitchFamily="34" charset="0"/>
+              <a:buChar char="•"/>
+            </a:pPr>
+            <a:endParaRPr lang="en-US" sz="2000" dirty="0"/>
+          </a:p>
+          <a:p>
+            <a:pPr>
+              <a:lnSpc>
+                <a:spcPct val="150000"/>
+              </a:lnSpc>
+            </a:pPr>
+            <a:endParaRPr lang="en-US" sz="2000" dirty="0"/>
+          </a:p>
+        </p:txBody>
+      </p:sp>
     </p:spTree>
     <p:extLst>
       <p:ext uri="{BB962C8B-B14F-4D97-AF65-F5344CB8AC3E}">
@@ -8384,8 +9253,8 @@
         </p:nvSpPr>
         <p:spPr>
           <a:xfrm>
-            <a:off x="-5927" y="0"/>
-            <a:ext cx="12197927" cy="6115049"/>
+            <a:off x="-5927" y="12700"/>
+            <a:ext cx="12197927" cy="6118563"/>
           </a:xfrm>
           <a:prstGeom prst="rect">
             <a:avLst/>
@@ -8442,8 +9311,8 @@
         </p:nvSpPr>
         <p:spPr>
           <a:xfrm>
-            <a:off x="3019245" y="2773600"/>
-            <a:ext cx="6147582" cy="567848"/>
+            <a:off x="5094109" y="2601981"/>
+            <a:ext cx="1997853" cy="470000"/>
           </a:xfrm>
           <a:prstGeom prst="rect">
             <a:avLst/>
@@ -8462,7 +9331,7 @@
               </a:lnSpc>
             </a:pPr>
             <a:r>
-              <a:rPr lang="en-US" sz="8000" dirty="0">
+              <a:rPr lang="en-US" sz="4800" dirty="0">
                 <a:solidFill>
                   <a:schemeClr val="tx1">
                     <a:lumMod val="85000"/>
@@ -8470,9 +9339,9 @@
                   </a:schemeClr>
                 </a:solidFill>
               </a:rPr>
-              <a:t>Thank You!</a:t>
-            </a:r>
-            <a:endParaRPr lang="en-US" sz="7200" dirty="0">
+              <a:t>Demo!</a:t>
+            </a:r>
+            <a:endParaRPr lang="en-US" sz="4400" dirty="0">
               <a:solidFill>
                 <a:schemeClr val="tx1">
                   <a:lumMod val="75000"/>
@@ -8486,7 +9355,7 @@
     </p:spTree>
     <p:extLst>
       <p:ext uri="{BB962C8B-B14F-4D97-AF65-F5344CB8AC3E}">
-        <p14:creationId xmlns:p14="http://schemas.microsoft.com/office/powerpoint/2010/main" val="414926687"/>
+        <p14:creationId xmlns:p14="http://schemas.microsoft.com/office/powerpoint/2010/main" val="3074252111"/>
       </p:ext>
     </p:extLst>
   </p:cSld>
@@ -9236,18 +10105,18 @@
 </file>
 
 <file path=customXml/item2.xml><?xml version="1.0" encoding="utf-8"?>
-<p:properties xmlns:p="http://schemas.microsoft.com/office/2006/metadata/properties" xmlns:xsi="http://www.w3.org/2001/XMLSchema-instance" xmlns:pc="http://schemas.microsoft.com/office/infopath/2007/PartnerControls">
-  <documentManagement/>
-</p:properties>
-</file>
-
-<file path=customXml/item3.xml><?xml version="1.0" encoding="utf-8"?>
 <?mso-contentType ?>
 <FormTemplates xmlns="http://schemas.microsoft.com/sharepoint/v3/contenttype/forms">
   <Display>DocumentLibraryForm</Display>
   <Edit>DocumentLibraryForm</Edit>
   <New>DocumentLibraryForm</New>
 </FormTemplates>
+</file>
+
+<file path=customXml/item3.xml><?xml version="1.0" encoding="utf-8"?>
+<p:properties xmlns:p="http://schemas.microsoft.com/office/2006/metadata/properties" xmlns:xsi="http://www.w3.org/2001/XMLSchema-instance" xmlns:pc="http://schemas.microsoft.com/office/infopath/2007/PartnerControls">
+  <documentManagement/>
+</p:properties>
 </file>
 
 <file path=customXml/itemProps1.xml><?xml version="1.0" encoding="utf-8"?>
@@ -9270,6 +10139,14 @@
 </file>
 
 <file path=customXml/itemProps2.xml><?xml version="1.0" encoding="utf-8"?>
+<ds:datastoreItem xmlns:ds="http://schemas.openxmlformats.org/officeDocument/2006/customXml" ds:itemID="{0C22064C-1319-48D9-99A8-E6155754BCCB}">
+  <ds:schemaRefs>
+    <ds:schemaRef ds:uri="http://schemas.microsoft.com/sharepoint/v3/contenttype/forms"/>
+  </ds:schemaRefs>
+</ds:datastoreItem>
+</file>
+
+<file path=customXml/itemProps3.xml><?xml version="1.0" encoding="utf-8"?>
 <ds:datastoreItem xmlns:ds="http://schemas.openxmlformats.org/officeDocument/2006/customXml" ds:itemID="{92A6475F-74BE-49E2-AA53-D5190570A614}">
   <ds:schemaRefs>
     <ds:schemaRef ds:uri="http://schemas.microsoft.com/office/infopath/2007/PartnerControls"/>
@@ -9284,12 +10161,4 @@
     <ds:schemaRef ds:uri="http://purl.org/dc/elements/1.1/"/>
   </ds:schemaRefs>
 </ds:datastoreItem>
-</file>
-
-<file path=customXml/itemProps3.xml><?xml version="1.0" encoding="utf-8"?>
-<ds:datastoreItem xmlns:ds="http://schemas.openxmlformats.org/officeDocument/2006/customXml" ds:itemID="{0C22064C-1319-48D9-99A8-E6155754BCCB}">
-  <ds:schemaRefs>
-    <ds:schemaRef ds:uri="http://schemas.microsoft.com/sharepoint/v3/contenttype/forms"/>
-  </ds:schemaRefs>
-</ds:datastoreItem>
 </file>
</xml_diff>